<commit_message>
Updated Presentation for LS Purescript
</commit_message>
<xml_diff>
--- a/pptx/PureScript- JS.la presentation.pptx
+++ b/pptx/PureScript- JS.la presentation.pptx
@@ -14,13 +14,13 @@
     <p:sldId id="268" r:id="rId5"/>
     <p:sldId id="270" r:id="rId6"/>
     <p:sldId id="269" r:id="rId7"/>
-    <p:sldId id="273" r:id="rId8"/>
-    <p:sldId id="271" r:id="rId9"/>
-    <p:sldId id="272" r:id="rId10"/>
-    <p:sldId id="258" r:id="rId11"/>
-    <p:sldId id="259" r:id="rId12"/>
-    <p:sldId id="260" r:id="rId13"/>
-    <p:sldId id="261" r:id="rId14"/>
+    <p:sldId id="274" r:id="rId8"/>
+    <p:sldId id="273" r:id="rId9"/>
+    <p:sldId id="271" r:id="rId10"/>
+    <p:sldId id="272" r:id="rId11"/>
+    <p:sldId id="258" r:id="rId12"/>
+    <p:sldId id="259" r:id="rId13"/>
+    <p:sldId id="260" r:id="rId14"/>
     <p:sldId id="262" r:id="rId15"/>
     <p:sldId id="263" r:id="rId16"/>
     <p:sldId id="264" r:id="rId17"/>
@@ -597,107 +597,6 @@
   <p:cSld>
     <p:spTree>
       <p:nvGrpSpPr>
-        <p:cNvPr id="1" name="Shape 117"/>
-        <p:cNvGrpSpPr/>
-        <p:nvPr/>
-      </p:nvGrpSpPr>
-      <p:grpSpPr>
-        <a:xfrm>
-          <a:off x="0" y="0"/>
-          <a:ext cx="0" cy="0"/>
-          <a:chOff x="0" y="0"/>
-          <a:chExt cx="0" cy="0"/>
-        </a:xfrm>
-      </p:grpSpPr>
-      <p:sp>
-        <p:nvSpPr>
-          <p:cNvPr id="118" name="Shape 118"/>
-          <p:cNvSpPr>
-            <a:spLocks noGrp="1" noRot="1" noChangeAspect="1"/>
-          </p:cNvSpPr>
-          <p:nvPr>
-            <p:ph type="sldImg" idx="2"/>
-          </p:nvPr>
-        </p:nvSpPr>
-        <p:spPr>
-          <a:xfrm>
-            <a:off x="381300" y="685800"/>
-            <a:ext cx="6096000" cy="3429000"/>
-          </a:xfrm>
-          <a:custGeom>
-            <a:avLst/>
-            <a:gdLst/>
-            <a:ahLst/>
-            <a:cxnLst/>
-            <a:rect l="0" t="0" r="0" b="0"/>
-            <a:pathLst>
-              <a:path w="120000" h="120000" extrusionOk="0">
-                <a:moveTo>
-                  <a:pt x="0" y="0"/>
-                </a:moveTo>
-                <a:lnTo>
-                  <a:pt x="120000" y="0"/>
-                </a:lnTo>
-                <a:lnTo>
-                  <a:pt x="120000" y="120000"/>
-                </a:lnTo>
-                <a:lnTo>
-                  <a:pt x="0" y="120000"/>
-                </a:lnTo>
-                <a:close/>
-              </a:path>
-            </a:pathLst>
-          </a:custGeom>
-        </p:spPr>
-      </p:sp>
-      <p:sp>
-        <p:nvSpPr>
-          <p:cNvPr id="119" name="Shape 119"/>
-          <p:cNvSpPr txBox="1">
-            <a:spLocks noGrp="1"/>
-          </p:cNvSpPr>
-          <p:nvPr>
-            <p:ph type="body" idx="1"/>
-          </p:nvPr>
-        </p:nvSpPr>
-        <p:spPr>
-          <a:xfrm>
-            <a:off x="685800" y="4343400"/>
-            <a:ext cx="5486400" cy="4114800"/>
-          </a:xfrm>
-          <a:prstGeom prst="rect">
-            <a:avLst/>
-          </a:prstGeom>
-        </p:spPr>
-        <p:txBody>
-          <a:bodyPr lIns="91425" tIns="91425" rIns="91425" bIns="91425" anchor="t" anchorCtr="0">
-            <a:noAutofit/>
-          </a:bodyPr>
-          <a:lstStyle/>
-          <a:p>
-            <a:pPr lvl="0">
-              <a:spcBef>
-                <a:spcPts val="0"/>
-              </a:spcBef>
-              <a:buNone/>
-            </a:pPr>
-            <a:endParaRPr/>
-          </a:p>
-        </p:txBody>
-      </p:sp>
-    </p:spTree>
-  </p:cSld>
-  <p:clrMapOvr>
-    <a:masterClrMapping/>
-  </p:clrMapOvr>
-</p:notes>
-</file>
-
-<file path=ppt/notesSlides/notesSlide11.xml><?xml version="1.0" encoding="utf-8"?>
-<p:notes xmlns:a="http://schemas.openxmlformats.org/drawingml/2006/main" xmlns:r="http://schemas.openxmlformats.org/officeDocument/2006/relationships" xmlns:p="http://schemas.openxmlformats.org/presentationml/2006/main" showMasterSp="0" showMasterPhAnim="0">
-  <p:cSld>
-    <p:spTree>
-      <p:nvGrpSpPr>
         <p:cNvPr id="1" name="Shape 123"/>
         <p:cNvGrpSpPr/>
         <p:nvPr/>
@@ -1203,107 +1102,6 @@
   <p:cSld>
     <p:spTree>
       <p:nvGrpSpPr>
-        <p:cNvPr id="1" name="Shape 93"/>
-        <p:cNvGrpSpPr/>
-        <p:nvPr/>
-      </p:nvGrpSpPr>
-      <p:grpSpPr>
-        <a:xfrm>
-          <a:off x="0" y="0"/>
-          <a:ext cx="0" cy="0"/>
-          <a:chOff x="0" y="0"/>
-          <a:chExt cx="0" cy="0"/>
-        </a:xfrm>
-      </p:grpSpPr>
-      <p:sp>
-        <p:nvSpPr>
-          <p:cNvPr id="94" name="Shape 94"/>
-          <p:cNvSpPr>
-            <a:spLocks noGrp="1" noRot="1" noChangeAspect="1"/>
-          </p:cNvSpPr>
-          <p:nvPr>
-            <p:ph type="sldImg" idx="2"/>
-          </p:nvPr>
-        </p:nvSpPr>
-        <p:spPr>
-          <a:xfrm>
-            <a:off x="381300" y="685800"/>
-            <a:ext cx="6096000" cy="3429000"/>
-          </a:xfrm>
-          <a:custGeom>
-            <a:avLst/>
-            <a:gdLst/>
-            <a:ahLst/>
-            <a:cxnLst/>
-            <a:rect l="0" t="0" r="0" b="0"/>
-            <a:pathLst>
-              <a:path w="120000" h="120000" extrusionOk="0">
-                <a:moveTo>
-                  <a:pt x="0" y="0"/>
-                </a:moveTo>
-                <a:lnTo>
-                  <a:pt x="120000" y="0"/>
-                </a:lnTo>
-                <a:lnTo>
-                  <a:pt x="120000" y="120000"/>
-                </a:lnTo>
-                <a:lnTo>
-                  <a:pt x="0" y="120000"/>
-                </a:lnTo>
-                <a:close/>
-              </a:path>
-            </a:pathLst>
-          </a:custGeom>
-        </p:spPr>
-      </p:sp>
-      <p:sp>
-        <p:nvSpPr>
-          <p:cNvPr id="95" name="Shape 95"/>
-          <p:cNvSpPr txBox="1">
-            <a:spLocks noGrp="1"/>
-          </p:cNvSpPr>
-          <p:nvPr>
-            <p:ph type="body" idx="1"/>
-          </p:nvPr>
-        </p:nvSpPr>
-        <p:spPr>
-          <a:xfrm>
-            <a:off x="685800" y="4343400"/>
-            <a:ext cx="5486400" cy="4114800"/>
-          </a:xfrm>
-          <a:prstGeom prst="rect">
-            <a:avLst/>
-          </a:prstGeom>
-        </p:spPr>
-        <p:txBody>
-          <a:bodyPr lIns="91425" tIns="91425" rIns="91425" bIns="91425" anchor="t" anchorCtr="0">
-            <a:noAutofit/>
-          </a:bodyPr>
-          <a:lstStyle/>
-          <a:p>
-            <a:pPr lvl="0">
-              <a:spcBef>
-                <a:spcPts val="0"/>
-              </a:spcBef>
-              <a:buNone/>
-            </a:pPr>
-            <a:endParaRPr/>
-          </a:p>
-        </p:txBody>
-      </p:sp>
-    </p:spTree>
-  </p:cSld>
-  <p:clrMapOvr>
-    <a:masterClrMapping/>
-  </p:clrMapOvr>
-</p:notes>
-</file>
-
-<file path=ppt/notesSlides/notesSlide7.xml><?xml version="1.0" encoding="utf-8"?>
-<p:notes xmlns:a="http://schemas.openxmlformats.org/drawingml/2006/main" xmlns:r="http://schemas.openxmlformats.org/officeDocument/2006/relationships" xmlns:p="http://schemas.openxmlformats.org/presentationml/2006/main" showMasterSp="0" showMasterPhAnim="0">
-  <p:cSld>
-    <p:spTree>
-      <p:nvGrpSpPr>
         <p:cNvPr id="1" name="Shape 99"/>
         <p:cNvGrpSpPr/>
         <p:nvPr/>
@@ -1400,7 +1198,7 @@
 </p:notes>
 </file>
 
-<file path=ppt/notesSlides/notesSlide8.xml><?xml version="1.0" encoding="utf-8"?>
+<file path=ppt/notesSlides/notesSlide7.xml><?xml version="1.0" encoding="utf-8"?>
 <p:notes xmlns:a="http://schemas.openxmlformats.org/drawingml/2006/main" xmlns:r="http://schemas.openxmlformats.org/officeDocument/2006/relationships" xmlns:p="http://schemas.openxmlformats.org/presentationml/2006/main" showMasterSp="0" showMasterPhAnim="0">
   <p:cSld>
     <p:spTree>
@@ -1501,7 +1299,7 @@
 </p:notes>
 </file>
 
-<file path=ppt/notesSlides/notesSlide9.xml><?xml version="1.0" encoding="utf-8"?>
+<file path=ppt/notesSlides/notesSlide8.xml><?xml version="1.0" encoding="utf-8"?>
 <p:notes xmlns:a="http://schemas.openxmlformats.org/drawingml/2006/main" xmlns:r="http://schemas.openxmlformats.org/officeDocument/2006/relationships" xmlns:p="http://schemas.openxmlformats.org/presentationml/2006/main" showMasterSp="0" showMasterPhAnim="0">
   <p:cSld>
     <p:spTree>
@@ -1562,6 +1360,107 @@
       <p:sp>
         <p:nvSpPr>
           <p:cNvPr id="113" name="Shape 113"/>
+          <p:cNvSpPr txBox="1">
+            <a:spLocks noGrp="1"/>
+          </p:cNvSpPr>
+          <p:nvPr>
+            <p:ph type="body" idx="1"/>
+          </p:nvPr>
+        </p:nvSpPr>
+        <p:spPr>
+          <a:xfrm>
+            <a:off x="685800" y="4343400"/>
+            <a:ext cx="5486400" cy="4114800"/>
+          </a:xfrm>
+          <a:prstGeom prst="rect">
+            <a:avLst/>
+          </a:prstGeom>
+        </p:spPr>
+        <p:txBody>
+          <a:bodyPr lIns="91425" tIns="91425" rIns="91425" bIns="91425" anchor="t" anchorCtr="0">
+            <a:noAutofit/>
+          </a:bodyPr>
+          <a:lstStyle/>
+          <a:p>
+            <a:pPr lvl="0">
+              <a:spcBef>
+                <a:spcPts val="0"/>
+              </a:spcBef>
+              <a:buNone/>
+            </a:pPr>
+            <a:endParaRPr/>
+          </a:p>
+        </p:txBody>
+      </p:sp>
+    </p:spTree>
+  </p:cSld>
+  <p:clrMapOvr>
+    <a:masterClrMapping/>
+  </p:clrMapOvr>
+</p:notes>
+</file>
+
+<file path=ppt/notesSlides/notesSlide9.xml><?xml version="1.0" encoding="utf-8"?>
+<p:notes xmlns:a="http://schemas.openxmlformats.org/drawingml/2006/main" xmlns:r="http://schemas.openxmlformats.org/officeDocument/2006/relationships" xmlns:p="http://schemas.openxmlformats.org/presentationml/2006/main" showMasterSp="0" showMasterPhAnim="0">
+  <p:cSld>
+    <p:spTree>
+      <p:nvGrpSpPr>
+        <p:cNvPr id="1" name="Shape 117"/>
+        <p:cNvGrpSpPr/>
+        <p:nvPr/>
+      </p:nvGrpSpPr>
+      <p:grpSpPr>
+        <a:xfrm>
+          <a:off x="0" y="0"/>
+          <a:ext cx="0" cy="0"/>
+          <a:chOff x="0" y="0"/>
+          <a:chExt cx="0" cy="0"/>
+        </a:xfrm>
+      </p:grpSpPr>
+      <p:sp>
+        <p:nvSpPr>
+          <p:cNvPr id="118" name="Shape 118"/>
+          <p:cNvSpPr>
+            <a:spLocks noGrp="1" noRot="1" noChangeAspect="1"/>
+          </p:cNvSpPr>
+          <p:nvPr>
+            <p:ph type="sldImg" idx="2"/>
+          </p:nvPr>
+        </p:nvSpPr>
+        <p:spPr>
+          <a:xfrm>
+            <a:off x="381300" y="685800"/>
+            <a:ext cx="6096000" cy="3429000"/>
+          </a:xfrm>
+          <a:custGeom>
+            <a:avLst/>
+            <a:gdLst/>
+            <a:ahLst/>
+            <a:cxnLst/>
+            <a:rect l="0" t="0" r="0" b="0"/>
+            <a:pathLst>
+              <a:path w="120000" h="120000" extrusionOk="0">
+                <a:moveTo>
+                  <a:pt x="0" y="0"/>
+                </a:moveTo>
+                <a:lnTo>
+                  <a:pt x="120000" y="0"/>
+                </a:lnTo>
+                <a:lnTo>
+                  <a:pt x="120000" y="120000"/>
+                </a:lnTo>
+                <a:lnTo>
+                  <a:pt x="0" y="120000"/>
+                </a:lnTo>
+                <a:close/>
+              </a:path>
+            </a:pathLst>
+          </a:custGeom>
+        </p:spPr>
+      </p:sp>
+      <p:sp>
+        <p:nvSpPr>
+          <p:cNvPr id="119" name="Shape 119"/>
           <p:cNvSpPr txBox="1">
             <a:spLocks noGrp="1"/>
           </p:cNvSpPr>
@@ -5632,13 +5531,26 @@
               <a:buNone/>
             </a:pPr>
             <a:r>
-              <a:rPr lang="en">
-                <a:solidFill>
-                  <a:srgbClr val="FFFFFF"/>
-                </a:solidFill>
-              </a:rPr>
-              <a:t>JS.la</a:t>
-            </a:r>
+              <a:rPr lang="en-US" dirty="0" smtClean="0">
+                <a:solidFill>
+                  <a:srgbClr val="FFFFFF"/>
+                </a:solidFill>
+              </a:rPr>
+              <a:t>LA </a:t>
+            </a:r>
+            <a:r>
+              <a:rPr lang="en-US" dirty="0" err="1" smtClean="0">
+                <a:solidFill>
+                  <a:srgbClr val="FFFFFF"/>
+                </a:solidFill>
+              </a:rPr>
+              <a:t>PureScript</a:t>
+            </a:r>
+            <a:endParaRPr lang="en" dirty="0">
+              <a:solidFill>
+                <a:srgbClr val="FFFFFF"/>
+              </a:solidFill>
+            </a:endParaRPr>
           </a:p>
         </p:txBody>
       </p:sp>
@@ -5747,10 +5659,96 @@
   <p:clrMapOvr>
     <a:masterClrMapping/>
   </p:clrMapOvr>
+  <p:timing>
+    <p:tnLst>
+      <p:par>
+        <p:cTn id="1" dur="indefinite" restart="never" nodeType="tmRoot"/>
+      </p:par>
+    </p:tnLst>
+  </p:timing>
 </p:sld>
 </file>
 
 <file path=ppt/slides/slide10.xml><?xml version="1.0" encoding="utf-8"?>
+<p:sld xmlns:a="http://schemas.openxmlformats.org/drawingml/2006/main" xmlns:r="http://schemas.openxmlformats.org/officeDocument/2006/relationships" xmlns:p="http://schemas.openxmlformats.org/presentationml/2006/main">
+  <p:cSld>
+    <p:spTree>
+      <p:nvGrpSpPr>
+        <p:cNvPr id="1" name=""/>
+        <p:cNvGrpSpPr/>
+        <p:nvPr/>
+      </p:nvGrpSpPr>
+      <p:grpSpPr>
+        <a:xfrm>
+          <a:off x="0" y="0"/>
+          <a:ext cx="0" cy="0"/>
+          <a:chOff x="0" y="0"/>
+          <a:chExt cx="0" cy="0"/>
+        </a:xfrm>
+      </p:grpSpPr>
+      <p:sp>
+        <p:nvSpPr>
+          <p:cNvPr id="2" name="Title 1"/>
+          <p:cNvSpPr>
+            <a:spLocks noGrp="1"/>
+          </p:cNvSpPr>
+          <p:nvPr>
+            <p:ph type="title"/>
+          </p:nvPr>
+        </p:nvSpPr>
+        <p:spPr/>
+        <p:txBody>
+          <a:bodyPr/>
+          <a:lstStyle/>
+          <a:p>
+            <a:r>
+              <a:rPr lang="en-US" dirty="0" smtClean="0"/>
+              <a:t>`do` notation</a:t>
+            </a:r>
+            <a:endParaRPr lang="en-US" dirty="0"/>
+          </a:p>
+        </p:txBody>
+      </p:sp>
+      <p:sp>
+        <p:nvSpPr>
+          <p:cNvPr id="3" name="Text Placeholder 2"/>
+          <p:cNvSpPr>
+            <a:spLocks noGrp="1"/>
+          </p:cNvSpPr>
+          <p:nvPr>
+            <p:ph type="body" idx="1"/>
+          </p:nvPr>
+        </p:nvSpPr>
+        <p:spPr/>
+        <p:txBody>
+          <a:bodyPr/>
+          <a:lstStyle/>
+          <a:p>
+            <a:endParaRPr lang="en-US"/>
+          </a:p>
+        </p:txBody>
+      </p:sp>
+    </p:spTree>
+    <p:extLst>
+      <p:ext uri="{BB962C8B-B14F-4D97-AF65-F5344CB8AC3E}">
+        <p14:creationId xmlns:p14="http://schemas.microsoft.com/office/powerpoint/2010/main" val="2034874566"/>
+      </p:ext>
+    </p:extLst>
+  </p:cSld>
+  <p:clrMapOvr>
+    <a:masterClrMapping/>
+  </p:clrMapOvr>
+  <p:timing>
+    <p:tnLst>
+      <p:par>
+        <p:cTn id="1" dur="indefinite" restart="never" nodeType="tmRoot"/>
+      </p:par>
+    </p:tnLst>
+  </p:timing>
+</p:sld>
+</file>
+
+<file path=ppt/slides/slide11.xml><?xml version="1.0" encoding="utf-8"?>
 <p:sld xmlns:a="http://schemas.openxmlformats.org/drawingml/2006/main" xmlns:r="http://schemas.openxmlformats.org/officeDocument/2006/relationships" xmlns:p="http://schemas.openxmlformats.org/presentationml/2006/main">
   <p:cSld>
     <p:spTree>
@@ -7805,10 +7803,17 @@
   <p:clrMapOvr>
     <a:masterClrMapping/>
   </p:clrMapOvr>
+  <p:timing>
+    <p:tnLst>
+      <p:par>
+        <p:cTn id="1" dur="indefinite" restart="never" nodeType="tmRoot"/>
+      </p:par>
+    </p:tnLst>
+  </p:timing>
 </p:sld>
 </file>
 
-<file path=ppt/slides/slide11.xml><?xml version="1.0" encoding="utf-8"?>
+<file path=ppt/slides/slide12.xml><?xml version="1.0" encoding="utf-8"?>
 <p:sld xmlns:a="http://schemas.openxmlformats.org/drawingml/2006/main" xmlns:r="http://schemas.openxmlformats.org/officeDocument/2006/relationships" xmlns:p="http://schemas.openxmlformats.org/presentationml/2006/main">
   <p:cSld>
     <p:spTree>
@@ -11699,10 +11704,17 @@
   <p:clrMapOvr>
     <a:masterClrMapping/>
   </p:clrMapOvr>
+  <p:timing>
+    <p:tnLst>
+      <p:par>
+        <p:cTn id="1" dur="indefinite" restart="never" nodeType="tmRoot"/>
+      </p:par>
+    </p:tnLst>
+  </p:timing>
 </p:sld>
 </file>
 
-<file path=ppt/slides/slide12.xml><?xml version="1.0" encoding="utf-8"?>
+<file path=ppt/slides/slide13.xml><?xml version="1.0" encoding="utf-8"?>
 <p:sld xmlns:a="http://schemas.openxmlformats.org/drawingml/2006/main" xmlns:r="http://schemas.openxmlformats.org/officeDocument/2006/relationships" xmlns:p="http://schemas.openxmlformats.org/presentationml/2006/main">
   <p:cSld>
     <p:spTree>
@@ -12754,104 +12766,13 @@
   <p:clrMapOvr>
     <a:masterClrMapping/>
   </p:clrMapOvr>
-</p:sld>
-</file>
-
-<file path=ppt/slides/slide13.xml><?xml version="1.0" encoding="utf-8"?>
-<p:sld xmlns:a="http://schemas.openxmlformats.org/drawingml/2006/main" xmlns:r="http://schemas.openxmlformats.org/officeDocument/2006/relationships" xmlns:p="http://schemas.openxmlformats.org/presentationml/2006/main">
-  <p:cSld>
-    <p:spTree>
-      <p:nvGrpSpPr>
-        <p:cNvPr id="1" name="Shape 96"/>
-        <p:cNvGrpSpPr/>
-        <p:nvPr/>
-      </p:nvGrpSpPr>
-      <p:grpSpPr>
-        <a:xfrm>
-          <a:off x="0" y="0"/>
-          <a:ext cx="0" cy="0"/>
-          <a:chOff x="0" y="0"/>
-          <a:chExt cx="0" cy="0"/>
-        </a:xfrm>
-      </p:grpSpPr>
-      <p:sp>
-        <p:nvSpPr>
-          <p:cNvPr id="97" name="Shape 97"/>
-          <p:cNvSpPr txBox="1">
-            <a:spLocks noGrp="1"/>
-          </p:cNvSpPr>
-          <p:nvPr>
-            <p:ph type="title"/>
-          </p:nvPr>
-        </p:nvSpPr>
-        <p:spPr>
-          <a:xfrm>
-            <a:off x="311700" y="445025"/>
-            <a:ext cx="8520600" cy="572700"/>
-          </a:xfrm>
-          <a:prstGeom prst="rect">
-            <a:avLst/>
-          </a:prstGeom>
-        </p:spPr>
-        <p:txBody>
-          <a:bodyPr lIns="91425" tIns="91425" rIns="91425" bIns="91425" anchor="t" anchorCtr="0">
-            <a:noAutofit/>
-          </a:bodyPr>
-          <a:lstStyle/>
-          <a:p>
-            <a:pPr lvl="0">
-              <a:spcBef>
-                <a:spcPts val="0"/>
-              </a:spcBef>
-              <a:buNone/>
-            </a:pPr>
-            <a:r>
-              <a:rPr lang="en"/>
-              <a:t>What is Purely Functional Coding</a:t>
-            </a:r>
-          </a:p>
-        </p:txBody>
-      </p:sp>
-      <p:sp>
-        <p:nvSpPr>
-          <p:cNvPr id="98" name="Shape 98"/>
-          <p:cNvSpPr txBox="1">
-            <a:spLocks noGrp="1"/>
-          </p:cNvSpPr>
-          <p:nvPr>
-            <p:ph type="body" idx="1"/>
-          </p:nvPr>
-        </p:nvSpPr>
-        <p:spPr>
-          <a:xfrm>
-            <a:off x="311700" y="1152475"/>
-            <a:ext cx="8520600" cy="3416400"/>
-          </a:xfrm>
-          <a:prstGeom prst="rect">
-            <a:avLst/>
-          </a:prstGeom>
-        </p:spPr>
-        <p:txBody>
-          <a:bodyPr lIns="91425" tIns="91425" rIns="91425" bIns="91425" anchor="t" anchorCtr="0">
-            <a:noAutofit/>
-          </a:bodyPr>
-          <a:lstStyle/>
-          <a:p>
-            <a:pPr lvl="0">
-              <a:spcBef>
-                <a:spcPts val="0"/>
-              </a:spcBef>
-              <a:buNone/>
-            </a:pPr>
-            <a:endParaRPr/>
-          </a:p>
-        </p:txBody>
-      </p:sp>
-    </p:spTree>
-  </p:cSld>
-  <p:clrMapOvr>
-    <a:masterClrMapping/>
-  </p:clrMapOvr>
+  <p:timing>
+    <p:tnLst>
+      <p:par>
+        <p:cTn id="1" dur="indefinite" restart="never" nodeType="tmRoot"/>
+      </p:par>
+    </p:tnLst>
+  </p:timing>
 </p:sld>
 </file>
 
@@ -12950,6 +12871,13 @@
   <p:clrMapOvr>
     <a:masterClrMapping/>
   </p:clrMapOvr>
+  <p:timing>
+    <p:tnLst>
+      <p:par>
+        <p:cTn id="1" dur="indefinite" restart="never" nodeType="tmRoot"/>
+      </p:par>
+    </p:tnLst>
+  </p:timing>
 </p:sld>
 </file>
 
@@ -13048,6 +12976,13 @@
   <p:clrMapOvr>
     <a:masterClrMapping/>
   </p:clrMapOvr>
+  <p:timing>
+    <p:tnLst>
+      <p:par>
+        <p:cTn id="1" dur="indefinite" restart="never" nodeType="tmRoot"/>
+      </p:par>
+    </p:tnLst>
+  </p:timing>
 </p:sld>
 </file>
 
@@ -13146,6 +13081,13 @@
   <p:clrMapOvr>
     <a:masterClrMapping/>
   </p:clrMapOvr>
+  <p:timing>
+    <p:tnLst>
+      <p:par>
+        <p:cTn id="1" dur="indefinite" restart="never" nodeType="tmRoot"/>
+      </p:par>
+    </p:tnLst>
+  </p:timing>
 </p:sld>
 </file>
 
@@ -13244,6 +13186,13 @@
   <p:clrMapOvr>
     <a:masterClrMapping/>
   </p:clrMapOvr>
+  <p:timing>
+    <p:tnLst>
+      <p:par>
+        <p:cTn id="1" dur="indefinite" restart="never" nodeType="tmRoot"/>
+      </p:par>
+    </p:tnLst>
+  </p:timing>
 </p:sld>
 </file>
 
@@ -13339,6 +13288,13 @@
   <p:clrMapOvr>
     <a:masterClrMapping/>
   </p:clrMapOvr>
+  <p:timing>
+    <p:tnLst>
+      <p:par>
+        <p:cTn id="1" dur="indefinite" restart="never" nodeType="tmRoot"/>
+      </p:par>
+    </p:tnLst>
+  </p:timing>
 </p:sld>
 </file>
 
@@ -13500,6 +13456,13 @@
   <p:clrMapOvr>
     <a:masterClrMapping/>
   </p:clrMapOvr>
+  <p:timing>
+    <p:tnLst>
+      <p:par>
+        <p:cTn id="1" dur="indefinite" restart="never" nodeType="tmRoot"/>
+      </p:par>
+    </p:tnLst>
+  </p:timing>
 </p:sld>
 </file>
 
@@ -13662,6 +13625,13 @@
   <p:clrMapOvr>
     <a:masterClrMapping/>
   </p:clrMapOvr>
+  <p:timing>
+    <p:tnLst>
+      <p:par>
+        <p:cTn id="1" dur="indefinite" restart="never" nodeType="tmRoot"/>
+      </p:par>
+    </p:tnLst>
+  </p:timing>
 </p:sld>
 </file>
 
@@ -13742,8 +13712,38 @@
         </p:blipFill>
         <p:spPr>
           <a:xfrm>
-            <a:off x="2794856" y="260091"/>
+            <a:off x="915952" y="731375"/>
             <a:ext cx="2794000" cy="3352800"/>
+          </a:xfrm>
+          <a:prstGeom prst="rect">
+            <a:avLst/>
+          </a:prstGeom>
+        </p:spPr>
+      </p:pic>
+      <p:pic>
+        <p:nvPicPr>
+          <p:cNvPr id="6" name="Picture 5"/>
+          <p:cNvPicPr>
+            <a:picLocks noChangeAspect="1"/>
+          </p:cNvPicPr>
+          <p:nvPr/>
+        </p:nvPicPr>
+        <p:blipFill>
+          <a:blip r:embed="rId3">
+            <a:extLst>
+              <a:ext uri="{28A0092B-C50C-407E-A947-70E740481C1C}">
+                <a14:useLocalDpi xmlns:a14="http://schemas.microsoft.com/office/drawing/2010/main" val="0"/>
+              </a:ext>
+            </a:extLst>
+          </a:blip>
+          <a:stretch>
+            <a:fillRect/>
+          </a:stretch>
+        </p:blipFill>
+        <p:spPr>
+          <a:xfrm>
+            <a:off x="4467235" y="731375"/>
+            <a:ext cx="4062989" cy="3970121"/>
           </a:xfrm>
           <a:prstGeom prst="rect">
             <a:avLst/>
@@ -13760,6 +13760,13 @@
   <p:clrMapOvr>
     <a:masterClrMapping/>
   </p:clrMapOvr>
+  <p:timing>
+    <p:tnLst>
+      <p:par>
+        <p:cTn id="1" dur="indefinite" restart="never" nodeType="tmRoot"/>
+      </p:par>
+    </p:tnLst>
+  </p:timing>
 </p:sld>
 </file>
 
@@ -13932,6 +13939,13 @@
   <p:clrMapOvr>
     <a:masterClrMapping/>
   </p:clrMapOvr>
+  <p:timing>
+    <p:tnLst>
+      <p:par>
+        <p:cTn id="1" dur="indefinite" restart="never" nodeType="tmRoot"/>
+      </p:par>
+    </p:tnLst>
+  </p:timing>
 </p:sld>
 </file>
 
@@ -14249,6 +14263,13 @@
   <p:clrMapOvr>
     <a:masterClrMapping/>
   </p:clrMapOvr>
+  <p:timing>
+    <p:tnLst>
+      <p:par>
+        <p:cTn id="1" dur="indefinite" restart="never" nodeType="tmRoot"/>
+      </p:par>
+    </p:tnLst>
+  </p:timing>
 </p:sld>
 </file>
 
@@ -14286,7 +14307,11 @@
           <a:p>
             <a:r>
               <a:rPr lang="en-US" dirty="0" smtClean="0"/>
-              <a:t>Controlling Effects with Monads</a:t>
+              <a:t>Introducing </a:t>
+            </a:r>
+            <a:r>
+              <a:rPr lang="en-US" dirty="0" err="1" smtClean="0"/>
+              <a:t>PureScript</a:t>
             </a:r>
             <a:endParaRPr lang="en-US" dirty="0"/>
           </a:p>
@@ -14307,14 +14332,14 @@
           <a:bodyPr/>
           <a:lstStyle/>
           <a:p>
-            <a:endParaRPr lang="en-US"/>
+            <a:endParaRPr lang="en-US" dirty="0"/>
           </a:p>
         </p:txBody>
       </p:sp>
     </p:spTree>
     <p:extLst>
       <p:ext uri="{BB962C8B-B14F-4D97-AF65-F5344CB8AC3E}">
-        <p14:creationId xmlns:p14="http://schemas.microsoft.com/office/powerpoint/2010/main" val="1167442836"/>
+        <p14:creationId xmlns:p14="http://schemas.microsoft.com/office/powerpoint/2010/main" val="1096883712"/>
       </p:ext>
     </p:extLst>
   </p:cSld>
@@ -14358,19 +14383,8 @@
           <a:p>
             <a:r>
               <a:rPr lang="en-US" dirty="0" smtClean="0"/>
-              <a:t>Applicative </a:t>
-            </a:r>
-            <a:r>
-              <a:rPr lang="en-US" dirty="0" err="1" smtClean="0"/>
-              <a:t>Functors</a:t>
-            </a:r>
-            <a:r>
-              <a:rPr lang="en-US" dirty="0" smtClean="0"/>
-              <a:t/>
-            </a:r>
-            <a:br>
-              <a:rPr lang="en-US" dirty="0" smtClean="0"/>
-            </a:br>
+              <a:t>Controlling Effects with Monads</a:t>
+            </a:r>
             <a:endParaRPr lang="en-US" dirty="0"/>
           </a:p>
         </p:txBody>
@@ -14397,13 +14411,20 @@
     </p:spTree>
     <p:extLst>
       <p:ext uri="{BB962C8B-B14F-4D97-AF65-F5344CB8AC3E}">
-        <p14:creationId xmlns:p14="http://schemas.microsoft.com/office/powerpoint/2010/main" val="1114536279"/>
+        <p14:creationId xmlns:p14="http://schemas.microsoft.com/office/powerpoint/2010/main" val="1167442836"/>
       </p:ext>
     </p:extLst>
   </p:cSld>
   <p:clrMapOvr>
     <a:masterClrMapping/>
   </p:clrMapOvr>
+  <p:timing>
+    <p:tnLst>
+      <p:par>
+        <p:cTn id="1" dur="indefinite" restart="never" nodeType="tmRoot"/>
+      </p:par>
+    </p:tnLst>
+  </p:timing>
 </p:sld>
 </file>
 
@@ -14441,8 +14462,19 @@
           <a:p>
             <a:r>
               <a:rPr lang="en-US" dirty="0" smtClean="0"/>
-              <a:t>`do` notation</a:t>
-            </a:r>
+              <a:t>Applicative </a:t>
+            </a:r>
+            <a:r>
+              <a:rPr lang="en-US" dirty="0" err="1" smtClean="0"/>
+              <a:t>Functors</a:t>
+            </a:r>
+            <a:r>
+              <a:rPr lang="en-US" dirty="0" smtClean="0"/>
+              <a:t/>
+            </a:r>
+            <a:br>
+              <a:rPr lang="en-US" dirty="0" smtClean="0"/>
+            </a:br>
             <a:endParaRPr lang="en-US" dirty="0"/>
           </a:p>
         </p:txBody>
@@ -14469,13 +14501,20 @@
     </p:spTree>
     <p:extLst>
       <p:ext uri="{BB962C8B-B14F-4D97-AF65-F5344CB8AC3E}">
-        <p14:creationId xmlns:p14="http://schemas.microsoft.com/office/powerpoint/2010/main" val="2034874566"/>
+        <p14:creationId xmlns:p14="http://schemas.microsoft.com/office/powerpoint/2010/main" val="1114536279"/>
       </p:ext>
     </p:extLst>
   </p:cSld>
   <p:clrMapOvr>
     <a:masterClrMapping/>
   </p:clrMapOvr>
+  <p:timing>
+    <p:tnLst>
+      <p:par>
+        <p:cTn id="1" dur="indefinite" restart="never" nodeType="tmRoot"/>
+      </p:par>
+    </p:tnLst>
+  </p:timing>
 </p:sld>
 </file>
 

</xml_diff>